<commit_message>
Cambio en requisitos y añadidos Diagramas corregidos excepto clase
</commit_message>
<xml_diff>
--- a/Material/Presentación/presentacion.pptx
+++ b/Material/Presentación/presentacion.pptx
@@ -15507,25 +15507,38 @@
       </p:sp>
       <p:pic>
         <p:nvPicPr>
-          <p:cNvPr id="312" name="Imagen 311"/>
-          <p:cNvPicPr/>
+          <p:cNvPr id="3" name="Imagen 2">
+            <a:extLst>
+              <a:ext uri="{FF2B5EF4-FFF2-40B4-BE49-F238E27FC236}">
+                <a16:creationId xmlns:a16="http://schemas.microsoft.com/office/drawing/2014/main" id="{D11ED711-0A1D-47AD-BD22-A5210C9D051F}"/>
+              </a:ext>
+            </a:extLst>
+          </p:cNvPr>
+          <p:cNvPicPr>
+            <a:picLocks noChangeAspect="1"/>
+          </p:cNvPicPr>
           <p:nvPr/>
         </p:nvPicPr>
         <p:blipFill>
-          <a:blip r:embed="rId2"/>
-          <a:stretch/>
+          <a:blip r:embed="rId2">
+            <a:extLst>
+              <a:ext uri="{28A0092B-C50C-407E-A947-70E740481C1C}">
+                <a14:useLocalDpi xmlns:a14="http://schemas.microsoft.com/office/drawing/2010/main" val="0"/>
+              </a:ext>
+            </a:extLst>
+          </a:blip>
+          <a:stretch>
+            <a:fillRect/>
+          </a:stretch>
         </p:blipFill>
         <p:spPr>
           <a:xfrm>
-            <a:off x="360000" y="2102040"/>
-            <a:ext cx="9178920" cy="4434480"/>
-          </a:xfrm>
-          <a:prstGeom prst="rect">
-            <a:avLst/>
-          </a:prstGeom>
-          <a:ln>
-            <a:noFill/>
-          </a:ln>
+            <a:off x="80608" y="1560630"/>
+            <a:ext cx="9919408" cy="4438414"/>
+          </a:xfrm>
+          <a:prstGeom prst="rect">
+            <a:avLst/>
+          </a:prstGeom>
         </p:spPr>
       </p:pic>
     </p:spTree>
@@ -15780,25 +15793,38 @@
       </p:sp>
       <p:pic>
         <p:nvPicPr>
-          <p:cNvPr id="317" name="Imagen 316"/>
-          <p:cNvPicPr/>
+          <p:cNvPr id="3" name="Imagen 2">
+            <a:extLst>
+              <a:ext uri="{FF2B5EF4-FFF2-40B4-BE49-F238E27FC236}">
+                <a16:creationId xmlns:a16="http://schemas.microsoft.com/office/drawing/2014/main" id="{66D7BC1B-F6D0-47B4-AC7D-C6B391281262}"/>
+              </a:ext>
+            </a:extLst>
+          </p:cNvPr>
+          <p:cNvPicPr>
+            <a:picLocks noChangeAspect="1"/>
+          </p:cNvPicPr>
           <p:nvPr/>
         </p:nvPicPr>
         <p:blipFill>
-          <a:blip r:embed="rId2"/>
-          <a:stretch/>
+          <a:blip r:embed="rId2">
+            <a:extLst>
+              <a:ext uri="{28A0092B-C50C-407E-A947-70E740481C1C}">
+                <a14:useLocalDpi xmlns:a14="http://schemas.microsoft.com/office/drawing/2010/main" val="0"/>
+              </a:ext>
+            </a:extLst>
+          </a:blip>
+          <a:stretch>
+            <a:fillRect/>
+          </a:stretch>
         </p:blipFill>
         <p:spPr>
           <a:xfrm>
-            <a:off x="1872000" y="1512000"/>
-            <a:ext cx="6377760" cy="5182920"/>
-          </a:xfrm>
-          <a:prstGeom prst="rect">
-            <a:avLst/>
-          </a:prstGeom>
-          <a:ln>
-            <a:noFill/>
-          </a:ln>
+            <a:off x="583095" y="1524000"/>
+            <a:ext cx="6957391" cy="5857459"/>
+          </a:xfrm>
+          <a:prstGeom prst="rect">
+            <a:avLst/>
+          </a:prstGeom>
         </p:spPr>
       </p:pic>
     </p:spTree>
@@ -16451,25 +16477,38 @@
       </p:sp>
       <p:pic>
         <p:nvPicPr>
-          <p:cNvPr id="330" name="Imagen 329"/>
-          <p:cNvPicPr/>
+          <p:cNvPr id="3" name="Imagen 2">
+            <a:extLst>
+              <a:ext uri="{FF2B5EF4-FFF2-40B4-BE49-F238E27FC236}">
+                <a16:creationId xmlns:a16="http://schemas.microsoft.com/office/drawing/2014/main" id="{2F40F2EF-4747-4284-98D4-74F99783B83E}"/>
+              </a:ext>
+            </a:extLst>
+          </p:cNvPr>
+          <p:cNvPicPr>
+            <a:picLocks noChangeAspect="1"/>
+          </p:cNvPicPr>
           <p:nvPr/>
         </p:nvPicPr>
         <p:blipFill>
-          <a:blip r:embed="rId2"/>
-          <a:stretch/>
+          <a:blip r:embed="rId2">
+            <a:extLst>
+              <a:ext uri="{28A0092B-C50C-407E-A947-70E740481C1C}">
+                <a14:useLocalDpi xmlns:a14="http://schemas.microsoft.com/office/drawing/2010/main" val="0"/>
+              </a:ext>
+            </a:extLst>
+          </a:blip>
+          <a:stretch>
+            <a:fillRect/>
+          </a:stretch>
         </p:blipFill>
         <p:spPr>
           <a:xfrm>
-            <a:off x="518040" y="1980000"/>
-            <a:ext cx="8862840" cy="4678920"/>
-          </a:xfrm>
-          <a:prstGeom prst="rect">
-            <a:avLst/>
-          </a:prstGeom>
-          <a:ln>
-            <a:noFill/>
-          </a:ln>
+            <a:off x="360001" y="1668109"/>
+            <a:ext cx="9358920" cy="4576359"/>
+          </a:xfrm>
+          <a:prstGeom prst="rect">
+            <a:avLst/>
+          </a:prstGeom>
         </p:spPr>
       </p:pic>
     </p:spTree>
@@ -17869,34 +17908,14 @@
         </p:nvSpPr>
         <p:spPr>
           <a:xfrm>
-            <a:off x="504000" y="1853371"/>
-            <a:ext cx="9072000" cy="3005438"/>
+            <a:off x="504000" y="1707947"/>
+            <a:ext cx="9072000" cy="3296287"/>
           </a:xfrm>
         </p:spPr>
         <p:txBody>
           <a:bodyPr/>
           <a:lstStyle/>
           <a:p>
-            <a:pPr marL="342900" indent="-342900">
-              <a:buFont typeface="Arial" panose="020B0604020202020204" pitchFamily="34" charset="0"/>
-              <a:buChar char="•"/>
-            </a:pPr>
-            <a:r>
-              <a:rPr lang="es-ES" sz="2500" b="1" spc="-1" dirty="0">
-                <a:solidFill>
-                  <a:srgbClr val="1C1C1C"/>
-                </a:solidFill>
-                <a:latin typeface="Source Sans Pro Semibold" panose="020B0603030403020204" pitchFamily="34" charset="0"/>
-                <a:ea typeface="Source Sans Pro Semibold" panose="020B0603030403020204" pitchFamily="34" charset="0"/>
-              </a:rPr>
-              <a:t>Los platos de una misma mesa deben servirse a la vez</a:t>
-            </a:r>
-          </a:p>
-          <a:p>
-            <a:pPr marL="342900" indent="-342900">
-              <a:buFont typeface="Arial" panose="020B0604020202020204" pitchFamily="34" charset="0"/>
-              <a:buChar char="•"/>
-            </a:pPr>
             <a:endParaRPr lang="es-ES" sz="2500" b="1" spc="-1" dirty="0">
               <a:solidFill>
                 <a:srgbClr val="1C1C1C"/>
@@ -17947,6 +17966,33 @@
                 <a:latin typeface="Source Sans Pro Semibold"/>
               </a:rPr>
               <a:t>Comandas agrupadas por mesa.</a:t>
+            </a:r>
+          </a:p>
+          <a:p>
+            <a:pPr marL="342900" indent="-342900">
+              <a:buFont typeface="Arial" panose="020B0604020202020204" pitchFamily="34" charset="0"/>
+              <a:buChar char="•"/>
+            </a:pPr>
+            <a:endParaRPr lang="es-ES" sz="2400" b="1" spc="-1" dirty="0">
+              <a:solidFill>
+                <a:srgbClr val="1C1C1C"/>
+              </a:solidFill>
+              <a:latin typeface="Source Sans Pro Semibold"/>
+            </a:endParaRPr>
+          </a:p>
+          <a:p>
+            <a:pPr marL="342900" indent="-342900">
+              <a:buFont typeface="Arial" panose="020B0604020202020204" pitchFamily="34" charset="0"/>
+              <a:buChar char="•"/>
+            </a:pPr>
+            <a:r>
+              <a:rPr lang="es-ES" sz="2400" b="1" spc="-1" dirty="0">
+                <a:solidFill>
+                  <a:srgbClr val="1C1C1C"/>
+                </a:solidFill>
+                <a:latin typeface="Source Sans Pro Semibold"/>
+              </a:rPr>
+              <a:t>Ordenar Mesas según su estado  </a:t>
             </a:r>
             <a:endParaRPr lang="es-ES" sz="2400" spc="-1" dirty="0"/>
           </a:p>
@@ -18488,25 +18534,38 @@
       </p:sp>
       <p:pic>
         <p:nvPicPr>
-          <p:cNvPr id="301" name="Imagen 300"/>
-          <p:cNvPicPr/>
+          <p:cNvPr id="3" name="Imagen 2">
+            <a:extLst>
+              <a:ext uri="{FF2B5EF4-FFF2-40B4-BE49-F238E27FC236}">
+                <a16:creationId xmlns:a16="http://schemas.microsoft.com/office/drawing/2014/main" id="{F1BDD349-F2BE-4B1E-B4D6-8671F7811351}"/>
+              </a:ext>
+            </a:extLst>
+          </p:cNvPr>
+          <p:cNvPicPr>
+            <a:picLocks noChangeAspect="1"/>
+          </p:cNvPicPr>
           <p:nvPr/>
         </p:nvPicPr>
         <p:blipFill>
-          <a:blip r:embed="rId2"/>
-          <a:stretch/>
+          <a:blip r:embed="rId2">
+            <a:extLst>
+              <a:ext uri="{28A0092B-C50C-407E-A947-70E740481C1C}">
+                <a14:useLocalDpi xmlns:a14="http://schemas.microsoft.com/office/drawing/2010/main" val="0"/>
+              </a:ext>
+            </a:extLst>
+          </a:blip>
+          <a:stretch>
+            <a:fillRect/>
+          </a:stretch>
         </p:blipFill>
         <p:spPr>
           <a:xfrm>
-            <a:off x="1029240" y="1807920"/>
-            <a:ext cx="8042400" cy="4383720"/>
-          </a:xfrm>
-          <a:prstGeom prst="rect">
-            <a:avLst/>
-          </a:prstGeom>
-          <a:ln>
-            <a:noFill/>
-          </a:ln>
+            <a:off x="701320" y="1583453"/>
+            <a:ext cx="8677983" cy="5256045"/>
+          </a:xfrm>
+          <a:prstGeom prst="rect">
+            <a:avLst/>
+          </a:prstGeom>
         </p:spPr>
       </p:pic>
     </p:spTree>

</xml_diff>